<commit_message>
Update doc for caching
</commit_message>
<xml_diff>
--- a/doc/masters/caching/caching-steps.pptx
+++ b/doc/masters/caching/caching-steps.pptx
@@ -3097,14 +3097,67 @@
       </p:grpSpPr>
       <p:sp>
         <p:nvSpPr>
-          <p:cNvPr id="38" name="Rounded Rectangle 37"/>
+          <p:cNvPr id="235" name="Rounded Rectangle 234"/>
           <p:cNvSpPr/>
           <p:nvPr/>
         </p:nvSpPr>
         <p:spPr>
           <a:xfrm>
-            <a:off x="4289746" y="1468690"/>
-            <a:ext cx="4083788" cy="4237424"/>
+            <a:off x="3302000" y="1476602"/>
+            <a:ext cx="1295399" cy="4347910"/>
+          </a:xfrm>
+          <a:prstGeom prst="roundRect">
+            <a:avLst/>
+          </a:prstGeom>
+          <a:ln w="6350" cmpd="sng">
+            <a:solidFill>
+              <a:schemeClr val="bg1">
+                <a:lumMod val="85000"/>
+              </a:schemeClr>
+            </a:solidFill>
+          </a:ln>
+          <a:effectLst>
+            <a:outerShdw blurRad="276225" dist="63500" dir="2700000" sx="101000" sy="101000" algn="tl" rotWithShape="0">
+              <a:schemeClr val="bg1">
+                <a:lumMod val="50000"/>
+                <a:alpha val="40000"/>
+              </a:schemeClr>
+            </a:outerShdw>
+          </a:effectLst>
+        </p:spPr>
+        <p:style>
+          <a:lnRef idx="2">
+            <a:schemeClr val="dk1"/>
+          </a:lnRef>
+          <a:fillRef idx="1">
+            <a:schemeClr val="lt1"/>
+          </a:fillRef>
+          <a:effectRef idx="0">
+            <a:schemeClr val="dk1"/>
+          </a:effectRef>
+          <a:fontRef idx="minor">
+            <a:schemeClr val="dk1"/>
+          </a:fontRef>
+        </p:style>
+        <p:txBody>
+          <a:bodyPr rtlCol="0" anchor="t" anchorCtr="0"/>
+          <a:lstStyle/>
+          <a:p>
+            <a:pPr algn="ctr"/>
+            <a:endParaRPr lang="en-US" sz="3200" dirty="0"/>
+          </a:p>
+        </p:txBody>
+      </p:sp>
+      <p:sp>
+        <p:nvSpPr>
+          <p:cNvPr id="168" name="Rounded Rectangle 167"/>
+          <p:cNvSpPr/>
+          <p:nvPr/>
+        </p:nvSpPr>
+        <p:spPr>
+          <a:xfrm>
+            <a:off x="805235" y="1468690"/>
+            <a:ext cx="2259698" cy="4347910"/>
           </a:xfrm>
           <a:prstGeom prst="roundRect">
             <a:avLst/>
@@ -3142,14 +3195,59 @@
       </p:sp>
       <p:sp>
         <p:nvSpPr>
+          <p:cNvPr id="38" name="Rounded Rectangle 37"/>
+          <p:cNvSpPr/>
+          <p:nvPr/>
+        </p:nvSpPr>
+        <p:spPr>
+          <a:xfrm>
+            <a:off x="4893733" y="1493535"/>
+            <a:ext cx="3327400" cy="4347910"/>
+          </a:xfrm>
+          <a:prstGeom prst="roundRect">
+            <a:avLst/>
+          </a:prstGeom>
+          <a:effectLst>
+            <a:outerShdw blurRad="50800" dist="38100" dir="2700000" algn="tl" rotWithShape="0">
+              <a:prstClr val="black">
+                <a:alpha val="40000"/>
+              </a:prstClr>
+            </a:outerShdw>
+          </a:effectLst>
+        </p:spPr>
+        <p:style>
+          <a:lnRef idx="1">
+            <a:schemeClr val="dk1"/>
+          </a:lnRef>
+          <a:fillRef idx="2">
+            <a:schemeClr val="dk1"/>
+          </a:fillRef>
+          <a:effectRef idx="1">
+            <a:schemeClr val="dk1"/>
+          </a:effectRef>
+          <a:fontRef idx="minor">
+            <a:schemeClr val="dk1"/>
+          </a:fontRef>
+        </p:style>
+        <p:txBody>
+          <a:bodyPr rtlCol="0" anchor="t" anchorCtr="0"/>
+          <a:lstStyle/>
+          <a:p>
+            <a:pPr algn="ctr"/>
+            <a:endParaRPr lang="en-US" sz="3200" dirty="0"/>
+          </a:p>
+        </p:txBody>
+      </p:sp>
+      <p:sp>
+        <p:nvSpPr>
           <p:cNvPr id="5" name="Rectangle 4"/>
           <p:cNvSpPr/>
           <p:nvPr/>
         </p:nvSpPr>
         <p:spPr>
           <a:xfrm>
-            <a:off x="5704998" y="4767596"/>
-            <a:ext cx="1746061" cy="458314"/>
+            <a:off x="6338745" y="4992941"/>
+            <a:ext cx="1062911" cy="458314"/>
           </a:xfrm>
           <a:prstGeom prst="rect">
             <a:avLst/>
@@ -3189,8 +3287,8 @@
         </p:nvSpPr>
         <p:spPr>
           <a:xfrm>
-            <a:off x="2755152" y="563371"/>
-            <a:ext cx="3581128" cy="523220"/>
+            <a:off x="2603515" y="824981"/>
+            <a:ext cx="3927052" cy="523220"/>
           </a:xfrm>
           <a:prstGeom prst="rect">
             <a:avLst/>
@@ -3228,12 +3326,12 @@
               <a:t>Appweb </a:t>
             </a:r>
             <a:r>
-              <a:rPr lang="en-US" sz="2800" b="1" dirty="0" smtClean="0">
+              <a:rPr lang="en-US" sz="2800" b="1" smtClean="0">
                 <a:solidFill>
                   <a:srgbClr val="1F497D"/>
                 </a:solidFill>
               </a:rPr>
-              <a:t>Caching Paths</a:t>
+              <a:t>Caching Options</a:t>
             </a:r>
             <a:endParaRPr lang="en-US" sz="2800" b="1" dirty="0">
               <a:solidFill>
@@ -3251,8 +3349,8 @@
         </p:nvSpPr>
         <p:spPr>
           <a:xfrm>
-            <a:off x="5698647" y="2236558"/>
-            <a:ext cx="1746061" cy="458314"/>
+            <a:off x="5986760" y="2581883"/>
+            <a:ext cx="1746061" cy="625175"/>
           </a:xfrm>
           <a:prstGeom prst="rect">
             <a:avLst/>
@@ -3334,7 +3432,7 @@
         </p:nvCxnSpPr>
         <p:spPr>
           <a:xfrm>
-            <a:off x="2759119" y="4840035"/>
+            <a:off x="2192227" y="5160516"/>
             <a:ext cx="0" cy="176332"/>
           </a:xfrm>
           <a:prstGeom prst="line">
@@ -3470,8 +3568,8 @@
         </p:nvSpPr>
         <p:spPr>
           <a:xfrm>
-            <a:off x="1880525" y="2172740"/>
-            <a:ext cx="1557315" cy="1043166"/>
+            <a:off x="1381366" y="2493221"/>
+            <a:ext cx="1289882" cy="1205460"/>
           </a:xfrm>
           <a:prstGeom prst="frame">
             <a:avLst/>
@@ -3506,7 +3604,7 @@
                   </a:schemeClr>
                 </a:solidFill>
               </a:rPr>
-              <a:t>Client</a:t>
+              <a:t>Display</a:t>
             </a:r>
             <a:endParaRPr lang="en-US" dirty="0">
               <a:solidFill>
@@ -3527,22 +3625,22 @@
         </p:nvSpPr>
         <p:spPr>
           <a:xfrm>
-            <a:off x="1878669" y="4371189"/>
-            <a:ext cx="1557316" cy="937691"/>
+            <a:off x="1634968" y="4690835"/>
+            <a:ext cx="936729" cy="760420"/>
           </a:xfrm>
           <a:prstGeom prst="can">
             <a:avLst/>
           </a:prstGeom>
         </p:spPr>
         <p:style>
-          <a:lnRef idx="1">
-            <a:schemeClr val="accent1"/>
+          <a:lnRef idx="0">
+            <a:schemeClr val="accent6"/>
           </a:lnRef>
           <a:fillRef idx="3">
-            <a:schemeClr val="accent1"/>
+            <a:schemeClr val="accent6"/>
           </a:fillRef>
-          <a:effectRef idx="2">
-            <a:schemeClr val="accent1"/>
+          <a:effectRef idx="3">
+            <a:schemeClr val="accent6"/>
           </a:effectRef>
           <a:fontRef idx="minor">
             <a:schemeClr val="lt1"/>
@@ -3554,14 +3652,32 @@
           <a:p>
             <a:pPr algn="ctr"/>
             <a:r>
-              <a:rPr lang="en-US" dirty="0" smtClean="0"/>
+              <a:rPr lang="en-US" dirty="0" smtClean="0">
+                <a:solidFill>
+                  <a:schemeClr val="tx2">
+                    <a:lumMod val="50000"/>
+                  </a:schemeClr>
+                </a:solidFill>
+              </a:rPr>
               <a:t>Client</a:t>
             </a:r>
             <a:br>
-              <a:rPr lang="en-US" dirty="0" smtClean="0"/>
+              <a:rPr lang="en-US" dirty="0" smtClean="0">
+                <a:solidFill>
+                  <a:schemeClr val="tx2">
+                    <a:lumMod val="50000"/>
+                  </a:schemeClr>
+                </a:solidFill>
+              </a:rPr>
             </a:br>
             <a:r>
-              <a:rPr lang="en-US" dirty="0" smtClean="0"/>
+              <a:rPr lang="en-US" dirty="0" smtClean="0">
+                <a:solidFill>
+                  <a:schemeClr val="tx2">
+                    <a:lumMod val="50000"/>
+                  </a:schemeClr>
+                </a:solidFill>
+              </a:rPr>
               <a:t>Cache</a:t>
             </a:r>
           </a:p>
@@ -3577,16 +3693,16 @@
           <p:nvPr/>
         </p:nvCxnSpPr>
         <p:spPr>
-          <a:xfrm rot="10800000" flipH="1">
-            <a:off x="1878669" y="2694323"/>
-            <a:ext cx="1856" cy="2145712"/>
+          <a:xfrm rot="10800000">
+            <a:off x="1381366" y="3095951"/>
+            <a:ext cx="253602" cy="1975094"/>
           </a:xfrm>
           <a:prstGeom prst="bentConnector3">
             <a:avLst>
-              <a:gd name="adj1" fmla="val -20528017"/>
+              <a:gd name="adj1" fmla="val 190141"/>
             </a:avLst>
           </a:prstGeom>
-          <a:ln>
+          <a:ln w="38100" cmpd="sng">
             <a:solidFill>
               <a:srgbClr val="FF6600"/>
             </a:solidFill>
@@ -3616,8 +3732,8 @@
         </p:nvSpPr>
         <p:spPr>
           <a:xfrm>
-            <a:off x="5704999" y="3273192"/>
-            <a:ext cx="1746061" cy="937691"/>
+            <a:off x="6334661" y="3618520"/>
+            <a:ext cx="1050260" cy="752889"/>
           </a:xfrm>
           <a:prstGeom prst="can">
             <a:avLst/>
@@ -3671,47 +3787,6 @@
       </p:sp>
       <p:cxnSp>
         <p:nvCxnSpPr>
-          <p:cNvPr id="55" name="Elbow Connector 54"/>
-          <p:cNvCxnSpPr>
-            <a:stCxn id="44" idx="2"/>
-            <a:endCxn id="25" idx="3"/>
-          </p:cNvCxnSpPr>
-          <p:nvPr/>
-        </p:nvCxnSpPr>
-        <p:spPr>
-          <a:xfrm rot="10800000">
-            <a:off x="3437841" y="2694324"/>
-            <a:ext cx="2267159" cy="1047715"/>
-          </a:xfrm>
-          <a:prstGeom prst="bentConnector3">
-            <a:avLst>
-              <a:gd name="adj1" fmla="val 32821"/>
-            </a:avLst>
-          </a:prstGeom>
-          <a:ln>
-            <a:solidFill>
-              <a:srgbClr val="FFFF00"/>
-            </a:solidFill>
-            <a:tailEnd type="arrow"/>
-          </a:ln>
-        </p:spPr>
-        <p:style>
-          <a:lnRef idx="2">
-            <a:schemeClr val="accent1"/>
-          </a:lnRef>
-          <a:fillRef idx="0">
-            <a:schemeClr val="accent1"/>
-          </a:fillRef>
-          <a:effectRef idx="1">
-            <a:schemeClr val="accent1"/>
-          </a:effectRef>
-          <a:fontRef idx="minor">
-            <a:schemeClr val="tx1"/>
-          </a:fontRef>
-        </p:style>
-      </p:cxnSp>
-      <p:cxnSp>
-        <p:nvCxnSpPr>
           <p:cNvPr id="61" name="Elbow Connector 60"/>
           <p:cNvCxnSpPr>
             <a:stCxn id="18" idx="3"/>
@@ -3720,56 +3795,16 @@
           <p:nvPr/>
         </p:nvCxnSpPr>
         <p:spPr>
-          <a:xfrm>
-            <a:off x="7444708" y="2465715"/>
-            <a:ext cx="6351" cy="2531038"/>
+          <a:xfrm flipH="1">
+            <a:off x="7401656" y="2894471"/>
+            <a:ext cx="331165" cy="2327627"/>
           </a:xfrm>
           <a:prstGeom prst="bentConnector3">
             <a:avLst>
-              <a:gd name="adj1" fmla="val 6832278"/>
+              <a:gd name="adj1" fmla="val -69029"/>
             </a:avLst>
           </a:prstGeom>
-          <a:ln>
-            <a:solidFill>
-              <a:srgbClr val="486FD6"/>
-            </a:solidFill>
-            <a:tailEnd type="arrow"/>
-          </a:ln>
-        </p:spPr>
-        <p:style>
-          <a:lnRef idx="2">
-            <a:schemeClr val="accent1"/>
-          </a:lnRef>
-          <a:fillRef idx="0">
-            <a:schemeClr val="accent1"/>
-          </a:fillRef>
-          <a:effectRef idx="1">
-            <a:schemeClr val="accent1"/>
-          </a:effectRef>
-          <a:fontRef idx="minor">
-            <a:schemeClr val="tx1"/>
-          </a:fontRef>
-        </p:style>
-      </p:cxnSp>
-      <p:cxnSp>
-        <p:nvCxnSpPr>
-          <p:cNvPr id="64" name="Elbow Connector 63"/>
-          <p:cNvCxnSpPr>
-            <a:stCxn id="5" idx="1"/>
-          </p:cNvCxnSpPr>
-          <p:nvPr/>
-        </p:nvCxnSpPr>
-        <p:spPr>
-          <a:xfrm rot="10800000">
-            <a:off x="3437840" y="2980061"/>
-            <a:ext cx="2267158" cy="2016693"/>
-          </a:xfrm>
-          <a:prstGeom prst="bentConnector3">
-            <a:avLst>
-              <a:gd name="adj1" fmla="val 76515"/>
-            </a:avLst>
-          </a:prstGeom>
-          <a:ln>
+          <a:ln w="38100" cmpd="sng">
             <a:solidFill>
               <a:srgbClr val="486FD6"/>
             </a:solidFill>
@@ -3794,22 +3829,22 @@
       <p:cxnSp>
         <p:nvCxnSpPr>
           <p:cNvPr id="108" name="Straight Arrow Connector 107"/>
-          <p:cNvCxnSpPr>
-            <a:endCxn id="18" idx="1"/>
-          </p:cNvCxnSpPr>
+          <p:cNvCxnSpPr/>
           <p:nvPr/>
         </p:nvCxnSpPr>
         <p:spPr>
           <a:xfrm>
-            <a:off x="3437840" y="2465715"/>
-            <a:ext cx="2260807" cy="0"/>
+            <a:off x="2671248" y="2786196"/>
+            <a:ext cx="3315512" cy="0"/>
           </a:xfrm>
           <a:prstGeom prst="straightConnector1">
             <a:avLst/>
           </a:prstGeom>
-          <a:ln>
+          <a:ln w="38100" cmpd="sng">
             <a:solidFill>
-              <a:srgbClr val="FFF319"/>
+              <a:schemeClr val="accent4">
+                <a:lumMod val="75000"/>
+              </a:schemeClr>
             </a:solidFill>
             <a:tailEnd type="arrow"/>
           </a:ln>
@@ -3839,9 +3874,9 @@
           <p:nvPr/>
         </p:nvCxnSpPr>
         <p:spPr>
-          <a:xfrm rot="5400000">
-            <a:off x="2080614" y="3792619"/>
-            <a:ext cx="1155283" cy="1856"/>
+          <a:xfrm rot="16200000" flipH="1">
+            <a:off x="1568743" y="4156245"/>
+            <a:ext cx="992154" cy="77026"/>
           </a:xfrm>
           <a:prstGeom prst="bentConnector3">
             <a:avLst>
@@ -3874,19 +3909,20 @@
         <p:nvCxnSpPr>
           <p:cNvPr id="121" name="Straight Arrow Connector 120"/>
           <p:cNvCxnSpPr>
+            <a:stCxn id="18" idx="2"/>
             <a:endCxn id="44" idx="1"/>
           </p:cNvCxnSpPr>
           <p:nvPr/>
         </p:nvCxnSpPr>
         <p:spPr>
           <a:xfrm>
-            <a:off x="6575694" y="2771072"/>
-            <a:ext cx="2336" cy="502120"/>
+            <a:off x="6859791" y="3207058"/>
+            <a:ext cx="0" cy="411462"/>
           </a:xfrm>
           <a:prstGeom prst="straightConnector1">
             <a:avLst/>
           </a:prstGeom>
-          <a:ln>
+          <a:ln w="38100" cmpd="sng">
             <a:solidFill>
               <a:srgbClr val="FFFF00"/>
             </a:solidFill>
@@ -3916,8 +3952,8 @@
         </p:nvSpPr>
         <p:spPr>
           <a:xfrm>
-            <a:off x="2258920" y="3490376"/>
-            <a:ext cx="796813" cy="584776"/>
+            <a:off x="1263775" y="3910111"/>
+            <a:ext cx="1525061" cy="338554"/>
           </a:xfrm>
           <a:prstGeom prst="rect">
             <a:avLst/>
@@ -3927,10 +3963,64 @@
           </a:solidFill>
           <a:ln>
             <a:solidFill>
-              <a:srgbClr val="000000"/>
+              <a:schemeClr val="tx2">
+                <a:lumMod val="50000"/>
+              </a:schemeClr>
             </a:solidFill>
           </a:ln>
-          <a:effectLst/>
+          <a:effectLst>
+            <a:outerShdw blurRad="50800" dist="38100" dir="2700000" algn="tl" rotWithShape="0">
+              <a:prstClr val="black">
+                <a:alpha val="40000"/>
+              </a:prstClr>
+            </a:outerShdw>
+          </a:effectLst>
+        </p:spPr>
+        <p:txBody>
+          <a:bodyPr wrap="square" rtlCol="0">
+            <a:spAutoFit/>
+          </a:bodyPr>
+          <a:lstStyle/>
+          <a:p>
+            <a:pPr algn="ctr"/>
+            <a:r>
+              <a:rPr lang="en-US" sz="1600" b="1" dirty="0" smtClean="0">
+                <a:solidFill>
+                  <a:srgbClr val="000000"/>
+                </a:solidFill>
+              </a:rPr>
+              <a:t>1. Client Cache</a:t>
+            </a:r>
+            <a:endParaRPr lang="en-US" sz="1600" b="1" dirty="0">
+              <a:solidFill>
+                <a:srgbClr val="000000"/>
+              </a:solidFill>
+            </a:endParaRPr>
+          </a:p>
+        </p:txBody>
+      </p:sp>
+      <p:sp>
+        <p:nvSpPr>
+          <p:cNvPr id="136" name="TextBox 135"/>
+          <p:cNvSpPr txBox="1"/>
+          <p:nvPr/>
+        </p:nvSpPr>
+        <p:spPr>
+          <a:xfrm>
+            <a:off x="6122167" y="1596318"/>
+            <a:ext cx="1004452" cy="461665"/>
+          </a:xfrm>
+          <a:prstGeom prst="rect">
+            <a:avLst/>
+          </a:prstGeom>
+          <a:noFill/>
+          <a:effectLst>
+            <a:outerShdw blurRad="76200" dir="18900000" sy="23000" kx="-1200000" algn="bl" rotWithShape="0">
+              <a:prstClr val="black">
+                <a:alpha val="20000"/>
+              </a:prstClr>
+            </a:outerShdw>
+          </a:effectLst>
         </p:spPr>
         <p:txBody>
           <a:bodyPr wrap="none" rtlCol="0">
@@ -3938,63 +4028,36 @@
           </a:bodyPr>
           <a:lstStyle/>
           <a:p>
-            <a:pPr algn="ctr"/>
-            <a:r>
-              <a:rPr lang="en-US" sz="1600" dirty="0" smtClean="0">
-                <a:solidFill>
-                  <a:srgbClr val="FF6600"/>
-                </a:solidFill>
-              </a:rPr>
-              <a:t>Client</a:t>
-            </a:r>
-            <a:br>
-              <a:rPr lang="en-US" sz="1600" dirty="0" smtClean="0">
-                <a:solidFill>
-                  <a:srgbClr val="FF6600"/>
-                </a:solidFill>
-              </a:rPr>
-            </a:br>
-            <a:r>
-              <a:rPr lang="en-US" sz="1600" dirty="0" smtClean="0">
-                <a:solidFill>
-                  <a:srgbClr val="FF6600"/>
-                </a:solidFill>
-              </a:rPr>
-              <a:t>Cached</a:t>
-            </a:r>
-            <a:endParaRPr lang="en-US" sz="1600" dirty="0">
-              <a:solidFill>
-                <a:srgbClr val="FF6600"/>
-              </a:solidFill>
-            </a:endParaRPr>
-          </a:p>
-        </p:txBody>
-      </p:sp>
-      <p:sp>
-        <p:nvSpPr>
-          <p:cNvPr id="123" name="TextBox 122"/>
+            <a:r>
+              <a:rPr lang="en-US" sz="2400" dirty="0" smtClean="0"/>
+              <a:t>Server</a:t>
+            </a:r>
+            <a:endParaRPr lang="en-US" sz="2400" dirty="0"/>
+          </a:p>
+        </p:txBody>
+      </p:sp>
+      <p:sp>
+        <p:nvSpPr>
+          <p:cNvPr id="169" name="TextBox 168"/>
           <p:cNvSpPr txBox="1"/>
           <p:nvPr/>
         </p:nvSpPr>
         <p:spPr>
           <a:xfrm>
-            <a:off x="4545716" y="2980060"/>
-            <a:ext cx="796813" cy="584776"/>
+            <a:off x="1634968" y="1576742"/>
+            <a:ext cx="907971" cy="461665"/>
           </a:xfrm>
           <a:prstGeom prst="rect">
             <a:avLst/>
           </a:prstGeom>
-          <a:solidFill>
-            <a:schemeClr val="bg1">
-              <a:lumMod val="65000"/>
-            </a:schemeClr>
-          </a:solidFill>
-          <a:ln>
-            <a:solidFill>
-              <a:schemeClr val="tx1"/>
-            </a:solidFill>
-          </a:ln>
-          <a:effectLst/>
+          <a:noFill/>
+          <a:effectLst>
+            <a:outerShdw blurRad="76200" dir="18900000" sy="23000" kx="-1200000" algn="bl" rotWithShape="0">
+              <a:prstClr val="black">
+                <a:alpha val="20000"/>
+              </a:prstClr>
+            </a:outerShdw>
+          </a:effectLst>
         </p:spPr>
         <p:txBody>
           <a:bodyPr wrap="none" rtlCol="0">
@@ -4002,110 +4065,35 @@
           </a:bodyPr>
           <a:lstStyle/>
           <a:p>
-            <a:pPr algn="ctr"/>
-            <a:r>
-              <a:rPr lang="en-US" sz="1600" dirty="0" smtClean="0">
-                <a:solidFill>
-                  <a:srgbClr val="FFFF00"/>
-                </a:solidFill>
-              </a:rPr>
-              <a:t>Server</a:t>
-            </a:r>
-          </a:p>
-          <a:p>
-            <a:r>
-              <a:rPr lang="en-US" sz="1600" dirty="0" smtClean="0">
-                <a:solidFill>
-                  <a:srgbClr val="FFFF00"/>
-                </a:solidFill>
-              </a:rPr>
-              <a:t>Cached</a:t>
-            </a:r>
-            <a:endParaRPr lang="en-US" sz="1600" dirty="0">
-              <a:solidFill>
-                <a:srgbClr val="FFFF00"/>
-              </a:solidFill>
-            </a:endParaRPr>
-          </a:p>
-        </p:txBody>
-      </p:sp>
-      <p:sp>
-        <p:nvSpPr>
-          <p:cNvPr id="124" name="TextBox 123"/>
-          <p:cNvSpPr txBox="1"/>
-          <p:nvPr/>
-        </p:nvSpPr>
-        <p:spPr>
-          <a:xfrm>
-            <a:off x="4503381" y="4835246"/>
-            <a:ext cx="1013619" cy="338554"/>
-          </a:xfrm>
-          <a:prstGeom prst="rect">
-            <a:avLst/>
-          </a:prstGeom>
-          <a:ln w="12700" cmpd="sng"/>
-        </p:spPr>
-        <p:style>
-          <a:lnRef idx="2">
-            <a:schemeClr val="dk1"/>
-          </a:lnRef>
-          <a:fillRef idx="1">
-            <a:schemeClr val="lt1"/>
-          </a:fillRef>
-          <a:effectRef idx="0">
-            <a:schemeClr val="dk1"/>
-          </a:effectRef>
-          <a:fontRef idx="minor">
-            <a:schemeClr val="dk1"/>
-          </a:fontRef>
-        </p:style>
-        <p:txBody>
-          <a:bodyPr wrap="none" rtlCol="0">
-            <a:spAutoFit/>
-          </a:bodyPr>
-          <a:lstStyle/>
-          <a:p>
-            <a:r>
-              <a:rPr lang="en-US" sz="1600" dirty="0" err="1" smtClean="0">
-                <a:solidFill>
-                  <a:schemeClr val="tx2">
-                    <a:lumMod val="75000"/>
-                  </a:schemeClr>
-                </a:solidFill>
-              </a:rPr>
-              <a:t>Uncached</a:t>
-            </a:r>
-            <a:endParaRPr lang="en-US" sz="1600" dirty="0">
-              <a:solidFill>
-                <a:schemeClr val="tx2">
-                  <a:lumMod val="75000"/>
-                </a:schemeClr>
-              </a:solidFill>
-            </a:endParaRPr>
+            <a:r>
+              <a:rPr lang="en-US" sz="2400" dirty="0" smtClean="0"/>
+              <a:t>Client</a:t>
+            </a:r>
+            <a:endParaRPr lang="en-US" sz="2400" dirty="0"/>
           </a:p>
         </p:txBody>
       </p:sp>
       <p:cxnSp>
         <p:nvCxnSpPr>
-          <p:cNvPr id="130" name="Elbow Connector 129"/>
+          <p:cNvPr id="55" name="Elbow Connector 54"/>
           <p:cNvCxnSpPr>
-            <a:stCxn id="5" idx="0"/>
+            <a:stCxn id="44" idx="2"/>
           </p:cNvCxnSpPr>
           <p:nvPr/>
         </p:nvCxnSpPr>
         <p:spPr>
-          <a:xfrm rot="16200000" flipV="1">
-            <a:off x="6298506" y="4488072"/>
-            <a:ext cx="556713" cy="2335"/>
+          <a:xfrm rot="10800000">
+            <a:off x="2671249" y="3207059"/>
+            <a:ext cx="3663413" cy="787906"/>
           </a:xfrm>
           <a:prstGeom prst="bentConnector3">
             <a:avLst>
-              <a:gd name="adj1" fmla="val 50000"/>
+              <a:gd name="adj1" fmla="val 59476"/>
             </a:avLst>
           </a:prstGeom>
-          <a:ln>
+          <a:ln w="38100" cmpd="sng">
             <a:solidFill>
-              <a:srgbClr val="486FD6"/>
+              <a:srgbClr val="FFFF00"/>
             </a:solidFill>
             <a:tailEnd type="arrow"/>
           </a:ln>
@@ -4125,16 +4113,157 @@
           </a:fontRef>
         </p:style>
       </p:cxnSp>
-      <p:sp>
-        <p:nvSpPr>
-          <p:cNvPr id="136" name="TextBox 135"/>
+      <p:cxnSp>
+        <p:nvCxnSpPr>
+          <p:cNvPr id="64" name="Elbow Connector 63"/>
+          <p:cNvCxnSpPr>
+            <a:stCxn id="5" idx="1"/>
+          </p:cNvCxnSpPr>
+          <p:nvPr/>
+        </p:nvCxnSpPr>
+        <p:spPr>
+          <a:xfrm rot="10800000">
+            <a:off x="2620261" y="3449244"/>
+            <a:ext cx="3718485" cy="1772854"/>
+          </a:xfrm>
+          <a:prstGeom prst="bentConnector3">
+            <a:avLst>
+              <a:gd name="adj1" fmla="val 70265"/>
+            </a:avLst>
+          </a:prstGeom>
+          <a:ln w="38100" cmpd="sng">
+            <a:solidFill>
+              <a:srgbClr val="486FD6"/>
+            </a:solidFill>
+            <a:tailEnd type="arrow"/>
+          </a:ln>
+        </p:spPr>
+        <p:style>
+          <a:lnRef idx="2">
+            <a:schemeClr val="accent1"/>
+          </a:lnRef>
+          <a:fillRef idx="0">
+            <a:schemeClr val="accent1"/>
+          </a:fillRef>
+          <a:effectRef idx="1">
+            <a:schemeClr val="accent1"/>
+          </a:effectRef>
+          <a:fontRef idx="minor">
+            <a:schemeClr val="tx1"/>
+          </a:fontRef>
+        </p:style>
+      </p:cxnSp>
+      <p:sp>
+        <p:nvSpPr>
+          <p:cNvPr id="193" name="TextBox 192"/>
           <p:cNvSpPr txBox="1"/>
           <p:nvPr/>
         </p:nvSpPr>
         <p:spPr>
           <a:xfrm>
-            <a:off x="6075806" y="1579371"/>
-            <a:ext cx="1004452" cy="461665"/>
+            <a:off x="4377390" y="3825689"/>
+            <a:ext cx="1609370" cy="338554"/>
+          </a:xfrm>
+          <a:prstGeom prst="rect">
+            <a:avLst/>
+          </a:prstGeom>
+          <a:solidFill>
+            <a:schemeClr val="bg1"/>
+          </a:solidFill>
+          <a:ln>
+            <a:solidFill>
+              <a:schemeClr val="tx2">
+                <a:lumMod val="50000"/>
+              </a:schemeClr>
+            </a:solidFill>
+          </a:ln>
+          <a:effectLst>
+            <a:outerShdw blurRad="50800" dist="38100" dir="2700000" algn="tl" rotWithShape="0">
+              <a:prstClr val="black">
+                <a:alpha val="40000"/>
+              </a:prstClr>
+            </a:outerShdw>
+          </a:effectLst>
+        </p:spPr>
+        <p:txBody>
+          <a:bodyPr wrap="square" rtlCol="0">
+            <a:spAutoFit/>
+          </a:bodyPr>
+          <a:lstStyle/>
+          <a:p>
+            <a:pPr algn="ctr"/>
+            <a:r>
+              <a:rPr lang="en-US" sz="1600" b="1" dirty="0">
+                <a:solidFill>
+                  <a:srgbClr val="000000"/>
+                </a:solidFill>
+              </a:rPr>
+              <a:t>3</a:t>
+            </a:r>
+            <a:r>
+              <a:rPr lang="en-US" sz="1600" b="1" dirty="0" smtClean="0">
+                <a:solidFill>
+                  <a:srgbClr val="000000"/>
+                </a:solidFill>
+              </a:rPr>
+              <a:t>. Server Cache</a:t>
+            </a:r>
+            <a:endParaRPr lang="en-US" sz="1600" b="1" dirty="0">
+              <a:solidFill>
+                <a:srgbClr val="000000"/>
+              </a:solidFill>
+            </a:endParaRPr>
+          </a:p>
+        </p:txBody>
+      </p:sp>
+      <p:cxnSp>
+        <p:nvCxnSpPr>
+          <p:cNvPr id="194" name="Straight Arrow Connector 193"/>
+          <p:cNvCxnSpPr/>
+          <p:nvPr/>
+        </p:nvCxnSpPr>
+        <p:spPr>
+          <a:xfrm flipH="1">
+            <a:off x="2671248" y="2930137"/>
+            <a:ext cx="3315513" cy="0"/>
+          </a:xfrm>
+          <a:prstGeom prst="straightConnector1">
+            <a:avLst/>
+          </a:prstGeom>
+          <a:ln w="38100" cmpd="sng">
+            <a:solidFill>
+              <a:schemeClr val="accent4">
+                <a:lumMod val="75000"/>
+              </a:schemeClr>
+            </a:solidFill>
+            <a:tailEnd type="arrow"/>
+          </a:ln>
+        </p:spPr>
+        <p:style>
+          <a:lnRef idx="2">
+            <a:schemeClr val="accent1"/>
+          </a:lnRef>
+          <a:fillRef idx="0">
+            <a:schemeClr val="accent1"/>
+          </a:fillRef>
+          <a:effectRef idx="1">
+            <a:schemeClr val="accent1"/>
+          </a:effectRef>
+          <a:fontRef idx="minor">
+            <a:schemeClr val="tx1"/>
+          </a:fontRef>
+        </p:style>
+      </p:cxnSp>
+      <p:sp>
+        <p:nvSpPr>
+          <p:cNvPr id="236" name="TextBox 235"/>
+          <p:cNvSpPr txBox="1"/>
+          <p:nvPr/>
+        </p:nvSpPr>
+        <p:spPr>
+          <a:xfrm>
+            <a:off x="3313775" y="1596318"/>
+            <a:ext cx="1274708" cy="461665"/>
           </a:xfrm>
           <a:prstGeom prst="rect">
             <a:avLst/>
@@ -4155,13 +4284,185 @@
           <a:lstStyle/>
           <a:p>
             <a:r>
-              <a:rPr lang="en-US" sz="2400" dirty="0" smtClean="0"/>
-              <a:t>Server</a:t>
-            </a:r>
-            <a:endParaRPr lang="en-US" sz="2400" dirty="0"/>
-          </a:p>
-        </p:txBody>
-      </p:sp>
+              <a:rPr lang="en-US" sz="2400" dirty="0" smtClean="0">
+                <a:solidFill>
+                  <a:schemeClr val="tx2">
+                    <a:lumMod val="50000"/>
+                  </a:schemeClr>
+                </a:solidFill>
+              </a:rPr>
+              <a:t>Network</a:t>
+            </a:r>
+            <a:endParaRPr lang="en-US" sz="2400" dirty="0">
+              <a:solidFill>
+                <a:schemeClr val="tx2">
+                  <a:lumMod val="50000"/>
+                </a:schemeClr>
+              </a:solidFill>
+            </a:endParaRPr>
+          </a:p>
+        </p:txBody>
+      </p:sp>
+      <p:sp>
+        <p:nvSpPr>
+          <p:cNvPr id="166" name="TextBox 165"/>
+          <p:cNvSpPr txBox="1"/>
+          <p:nvPr/>
+        </p:nvSpPr>
+        <p:spPr>
+          <a:xfrm>
+            <a:off x="3666621" y="2662498"/>
+            <a:ext cx="1659466" cy="338554"/>
+          </a:xfrm>
+          <a:prstGeom prst="rect">
+            <a:avLst/>
+          </a:prstGeom>
+          <a:solidFill>
+            <a:schemeClr val="bg1"/>
+          </a:solidFill>
+          <a:ln>
+            <a:solidFill>
+              <a:schemeClr val="tx2">
+                <a:lumMod val="50000"/>
+              </a:schemeClr>
+            </a:solidFill>
+          </a:ln>
+          <a:effectLst>
+            <a:outerShdw blurRad="50800" dist="38100" dir="2700000" algn="tl" rotWithShape="0">
+              <a:prstClr val="black">
+                <a:alpha val="40000"/>
+              </a:prstClr>
+            </a:outerShdw>
+          </a:effectLst>
+        </p:spPr>
+        <p:txBody>
+          <a:bodyPr wrap="square" rtlCol="0">
+            <a:spAutoFit/>
+          </a:bodyPr>
+          <a:lstStyle/>
+          <a:p>
+            <a:pPr algn="ctr"/>
+            <a:r>
+              <a:rPr lang="en-US" sz="1600" b="1" dirty="0" smtClean="0">
+                <a:solidFill>
+                  <a:srgbClr val="000000"/>
+                </a:solidFill>
+              </a:rPr>
+              <a:t>2. Server Verified</a:t>
+            </a:r>
+            <a:endParaRPr lang="en-US" sz="1600" b="1" dirty="0">
+              <a:solidFill>
+                <a:srgbClr val="000000"/>
+              </a:solidFill>
+            </a:endParaRPr>
+          </a:p>
+        </p:txBody>
+      </p:sp>
+      <p:sp>
+        <p:nvSpPr>
+          <p:cNvPr id="167" name="TextBox 166"/>
+          <p:cNvSpPr txBox="1"/>
+          <p:nvPr/>
+        </p:nvSpPr>
+        <p:spPr>
+          <a:xfrm>
+            <a:off x="4245772" y="5052823"/>
+            <a:ext cx="1295922" cy="338554"/>
+          </a:xfrm>
+          <a:prstGeom prst="rect">
+            <a:avLst/>
+          </a:prstGeom>
+          <a:solidFill>
+            <a:schemeClr val="bg1"/>
+          </a:solidFill>
+          <a:ln>
+            <a:solidFill>
+              <a:schemeClr val="tx2">
+                <a:lumMod val="50000"/>
+              </a:schemeClr>
+            </a:solidFill>
+          </a:ln>
+          <a:effectLst>
+            <a:outerShdw blurRad="50800" dist="38100" dir="2700000" algn="tl" rotWithShape="0">
+              <a:prstClr val="black">
+                <a:alpha val="40000"/>
+              </a:prstClr>
+            </a:outerShdw>
+          </a:effectLst>
+        </p:spPr>
+        <p:txBody>
+          <a:bodyPr wrap="square" rtlCol="0">
+            <a:spAutoFit/>
+          </a:bodyPr>
+          <a:lstStyle/>
+          <a:p>
+            <a:pPr algn="ctr"/>
+            <a:r>
+              <a:rPr lang="en-US" sz="1600" b="1" dirty="0">
+                <a:solidFill>
+                  <a:srgbClr val="000000"/>
+                </a:solidFill>
+              </a:rPr>
+              <a:t>4</a:t>
+            </a:r>
+            <a:r>
+              <a:rPr lang="en-US" sz="1600" b="1" dirty="0" smtClean="0">
+                <a:solidFill>
+                  <a:srgbClr val="000000"/>
+                </a:solidFill>
+              </a:rPr>
+              <a:t>. </a:t>
+            </a:r>
+            <a:r>
+              <a:rPr lang="en-US" sz="1600" b="1" dirty="0" err="1" smtClean="0">
+                <a:solidFill>
+                  <a:srgbClr val="000000"/>
+                </a:solidFill>
+              </a:rPr>
+              <a:t>Uncached</a:t>
+            </a:r>
+            <a:endParaRPr lang="en-US" sz="1600" b="1" dirty="0">
+              <a:solidFill>
+                <a:srgbClr val="000000"/>
+              </a:solidFill>
+            </a:endParaRPr>
+          </a:p>
+        </p:txBody>
+      </p:sp>
+      <p:cxnSp>
+        <p:nvCxnSpPr>
+          <p:cNvPr id="271" name="Straight Arrow Connector 270"/>
+          <p:cNvCxnSpPr/>
+          <p:nvPr/>
+        </p:nvCxnSpPr>
+        <p:spPr>
+          <a:xfrm flipV="1">
+            <a:off x="6872491" y="4403725"/>
+            <a:ext cx="0" cy="589216"/>
+          </a:xfrm>
+          <a:prstGeom prst="straightConnector1">
+            <a:avLst/>
+          </a:prstGeom>
+          <a:ln>
+            <a:prstDash val="sysDash"/>
+            <a:tailEnd type="arrow"/>
+          </a:ln>
+        </p:spPr>
+        <p:style>
+          <a:lnRef idx="2">
+            <a:schemeClr val="accent1"/>
+          </a:lnRef>
+          <a:fillRef idx="0">
+            <a:schemeClr val="accent1"/>
+          </a:fillRef>
+          <a:effectRef idx="1">
+            <a:schemeClr val="accent1"/>
+          </a:effectRef>
+          <a:fontRef idx="minor">
+            <a:schemeClr val="tx1"/>
+          </a:fontRef>
+        </p:style>
+      </p:cxnSp>
     </p:spTree>
     <p:extLst>
       <p:ext uri="{BB962C8B-B14F-4D97-AF65-F5344CB8AC3E}">

</xml_diff>